<commit_message>
refactor : Updated presentation
</commit_message>
<xml_diff>
--- a/Presentation.pptx
+++ b/Presentation.pptx
@@ -264,7 +264,7 @@
           <a:p>
             <a:fld id="{C37DD4EB-E7BD-47EF-A2D1-8F9ACBBA40EF}" type="datetimeFigureOut">
               <a:rPr lang="en-US" smtClean="0"/>
-              <a:t>09-Apr-16</a:t>
+              <a:t>13-Apr-16</a:t>
             </a:fld>
             <a:endParaRPr lang="en-US"/>
           </a:p>
@@ -434,7 +434,7 @@
           <a:p>
             <a:fld id="{C37DD4EB-E7BD-47EF-A2D1-8F9ACBBA40EF}" type="datetimeFigureOut">
               <a:rPr lang="en-US" smtClean="0"/>
-              <a:t>09-Apr-16</a:t>
+              <a:t>13-Apr-16</a:t>
             </a:fld>
             <a:endParaRPr lang="en-US"/>
           </a:p>
@@ -614,7 +614,7 @@
           <a:p>
             <a:fld id="{C37DD4EB-E7BD-47EF-A2D1-8F9ACBBA40EF}" type="datetimeFigureOut">
               <a:rPr lang="en-US" smtClean="0"/>
-              <a:t>09-Apr-16</a:t>
+              <a:t>13-Apr-16</a:t>
             </a:fld>
             <a:endParaRPr lang="en-US"/>
           </a:p>
@@ -784,7 +784,7 @@
           <a:p>
             <a:fld id="{C37DD4EB-E7BD-47EF-A2D1-8F9ACBBA40EF}" type="datetimeFigureOut">
               <a:rPr lang="en-US" smtClean="0"/>
-              <a:t>09-Apr-16</a:t>
+              <a:t>13-Apr-16</a:t>
             </a:fld>
             <a:endParaRPr lang="en-US"/>
           </a:p>
@@ -1030,7 +1030,7 @@
           <a:p>
             <a:fld id="{C37DD4EB-E7BD-47EF-A2D1-8F9ACBBA40EF}" type="datetimeFigureOut">
               <a:rPr lang="en-US" smtClean="0"/>
-              <a:t>09-Apr-16</a:t>
+              <a:t>13-Apr-16</a:t>
             </a:fld>
             <a:endParaRPr lang="en-US"/>
           </a:p>
@@ -1262,7 +1262,7 @@
           <a:p>
             <a:fld id="{C37DD4EB-E7BD-47EF-A2D1-8F9ACBBA40EF}" type="datetimeFigureOut">
               <a:rPr lang="en-US" smtClean="0"/>
-              <a:t>09-Apr-16</a:t>
+              <a:t>13-Apr-16</a:t>
             </a:fld>
             <a:endParaRPr lang="en-US"/>
           </a:p>
@@ -1629,7 +1629,7 @@
           <a:p>
             <a:fld id="{C37DD4EB-E7BD-47EF-A2D1-8F9ACBBA40EF}" type="datetimeFigureOut">
               <a:rPr lang="en-US" smtClean="0"/>
-              <a:t>09-Apr-16</a:t>
+              <a:t>13-Apr-16</a:t>
             </a:fld>
             <a:endParaRPr lang="en-US"/>
           </a:p>
@@ -1747,7 +1747,7 @@
           <a:p>
             <a:fld id="{C37DD4EB-E7BD-47EF-A2D1-8F9ACBBA40EF}" type="datetimeFigureOut">
               <a:rPr lang="en-US" smtClean="0"/>
-              <a:t>09-Apr-16</a:t>
+              <a:t>13-Apr-16</a:t>
             </a:fld>
             <a:endParaRPr lang="en-US"/>
           </a:p>
@@ -1842,7 +1842,7 @@
           <a:p>
             <a:fld id="{C37DD4EB-E7BD-47EF-A2D1-8F9ACBBA40EF}" type="datetimeFigureOut">
               <a:rPr lang="en-US" smtClean="0"/>
-              <a:t>09-Apr-16</a:t>
+              <a:t>13-Apr-16</a:t>
             </a:fld>
             <a:endParaRPr lang="en-US"/>
           </a:p>
@@ -2246,7 +2246,7 @@
           <a:p>
             <a:fld id="{C37DD4EB-E7BD-47EF-A2D1-8F9ACBBA40EF}" type="datetimeFigureOut">
               <a:rPr lang="en-US" smtClean="0"/>
-              <a:t>09-Apr-16</a:t>
+              <a:t>13-Apr-16</a:t>
             </a:fld>
             <a:endParaRPr lang="en-US"/>
           </a:p>
@@ -2503,7 +2503,7 @@
           <a:p>
             <a:fld id="{C37DD4EB-E7BD-47EF-A2D1-8F9ACBBA40EF}" type="datetimeFigureOut">
               <a:rPr lang="en-US" smtClean="0"/>
-              <a:t>09-Apr-16</a:t>
+              <a:t>13-Apr-16</a:t>
             </a:fld>
             <a:endParaRPr lang="en-US"/>
           </a:p>
@@ -2716,7 +2716,7 @@
           <a:p>
             <a:fld id="{C37DD4EB-E7BD-47EF-A2D1-8F9ACBBA40EF}" type="datetimeFigureOut">
               <a:rPr lang="en-US" smtClean="0"/>
-              <a:t>09-Apr-16</a:t>
+              <a:t>13-Apr-16</a:t>
             </a:fld>
             <a:endParaRPr lang="en-US"/>
           </a:p>
@@ -3308,7 +3308,19 @@
                   </a:outerShdw>
                 </a:effectLst>
               </a:rPr>
-              <a:t>Associate. Professor, 	                                            </a:t>
+              <a:t>Professor and HOD, </a:t>
+            </a:r>
+            <a:r>
+              <a:rPr lang="en-US" dirty="0" smtClean="0">
+                <a:effectLst>
+                  <a:outerShdw blurRad="50800" dist="38100" dir="2700000" algn="tl">
+                    <a:srgbClr val="000000">
+                      <a:alpha val="40000"/>
+                    </a:srgbClr>
+                  </a:outerShdw>
+                </a:effectLst>
+              </a:rPr>
+              <a:t>	                                            </a:t>
             </a:r>
             <a:endParaRPr lang="en-US" dirty="0" smtClean="0"/>
           </a:p>
@@ -5214,8 +5226,12 @@
               <a:buChar char="•"/>
             </a:pPr>
             <a:r>
+              <a:rPr lang="en-US" sz="2400" dirty="0" err="1" smtClean="0"/>
+              <a:t>WebApp</a:t>
+            </a:r>
+            <a:r>
               <a:rPr lang="en-US" sz="2400" dirty="0" smtClean="0"/>
-              <a:t>Code </a:t>
+              <a:t> </a:t>
             </a:r>
             <a:r>
               <a:rPr lang="en-US" sz="2400" dirty="0"/>
@@ -5241,11 +5257,6 @@
               </a:rPr>
               <a:t>twitone.mybluemix.net</a:t>
             </a:r>
-            <a:endParaRPr lang="en-US" sz="2400" dirty="0" smtClean="0">
-              <a:solidFill>
-                <a:srgbClr val="61DAFB"/>
-              </a:solidFill>
-            </a:endParaRPr>
           </a:p>
           <a:p>
             <a:pPr marL="342900" lvl="0" indent="-342900">
@@ -5254,15 +5265,7 @@
             </a:pPr>
             <a:r>
               <a:rPr lang="en-US" sz="2400" dirty="0" smtClean="0"/>
-              <a:t>Code is </a:t>
-            </a:r>
-            <a:r>
-              <a:rPr lang="en-US" sz="2400" dirty="0" smtClean="0"/>
-              <a:t>Open-Sourced at this URL</a:t>
-            </a:r>
-            <a:r>
-              <a:rPr lang="en-US" sz="2400" dirty="0" smtClean="0"/>
-              <a:t> </a:t>
+              <a:t>Code is Open-Sourced at this URL </a:t>
             </a:r>
             <a:r>
               <a:rPr lang="en-US" sz="2400" dirty="0" smtClean="0">
@@ -5280,11 +5283,6 @@
               </a:rPr>
               <a:t>://github.com/LadwaAditya/TwiTone</a:t>
             </a:r>
-            <a:endParaRPr lang="en-US" sz="2400" dirty="0">
-              <a:solidFill>
-                <a:srgbClr val="61DAFB"/>
-              </a:solidFill>
-            </a:endParaRPr>
           </a:p>
         </p:txBody>
       </p:sp>

</xml_diff>